<commit_message>
Update or add song lyrics
</commit_message>
<xml_diff>
--- a/chinese/保護我的是耶和華.pptx
+++ b/chinese/保護我的是耶和華.pptx
@@ -297,7 +297,8 @@
           <a:p>
             <a:fld id="{A316576E-A9EF-4C0D-A32C-58F4A3F27278}" type="datetimeFigureOut">
               <a:rPr lang="zh-TW" altLang="en-US" smtClean="0"/>
-              <a:t>2019/2/11</a:t>
+              <a:pPr/>
+              <a:t>2019/2/24</a:t>
             </a:fld>
             <a:endParaRPr lang="zh-TW" altLang="en-US"/>
           </a:p>
@@ -339,6 +340,7 @@
           <a:p>
             <a:fld id="{E25A07D8-C1D8-4E95-BF69-D06ECFCCAECB}" type="slidenum">
               <a:rPr lang="zh-TW" altLang="en-US" smtClean="0"/>
+              <a:pPr/>
               <a:t>‹#›</a:t>
             </a:fld>
             <a:endParaRPr lang="zh-TW" altLang="en-US"/>
@@ -462,7 +464,8 @@
           <a:p>
             <a:fld id="{A316576E-A9EF-4C0D-A32C-58F4A3F27278}" type="datetimeFigureOut">
               <a:rPr lang="zh-TW" altLang="en-US" smtClean="0"/>
-              <a:t>2019/2/11</a:t>
+              <a:pPr/>
+              <a:t>2019/2/24</a:t>
             </a:fld>
             <a:endParaRPr lang="zh-TW" altLang="en-US"/>
           </a:p>
@@ -504,6 +507,7 @@
           <a:p>
             <a:fld id="{E25A07D8-C1D8-4E95-BF69-D06ECFCCAECB}" type="slidenum">
               <a:rPr lang="zh-TW" altLang="en-US" smtClean="0"/>
+              <a:pPr/>
               <a:t>‹#›</a:t>
             </a:fld>
             <a:endParaRPr lang="zh-TW" altLang="en-US"/>
@@ -637,7 +641,8 @@
           <a:p>
             <a:fld id="{A316576E-A9EF-4C0D-A32C-58F4A3F27278}" type="datetimeFigureOut">
               <a:rPr lang="zh-TW" altLang="en-US" smtClean="0"/>
-              <a:t>2019/2/11</a:t>
+              <a:pPr/>
+              <a:t>2019/2/24</a:t>
             </a:fld>
             <a:endParaRPr lang="zh-TW" altLang="en-US"/>
           </a:p>
@@ -679,6 +684,7 @@
           <a:p>
             <a:fld id="{E25A07D8-C1D8-4E95-BF69-D06ECFCCAECB}" type="slidenum">
               <a:rPr lang="zh-TW" altLang="en-US" smtClean="0"/>
+              <a:pPr/>
               <a:t>‹#›</a:t>
             </a:fld>
             <a:endParaRPr lang="zh-TW" altLang="en-US"/>
@@ -802,7 +808,8 @@
           <a:p>
             <a:fld id="{A316576E-A9EF-4C0D-A32C-58F4A3F27278}" type="datetimeFigureOut">
               <a:rPr lang="zh-TW" altLang="en-US" smtClean="0"/>
-              <a:t>2019/2/11</a:t>
+              <a:pPr/>
+              <a:t>2019/2/24</a:t>
             </a:fld>
             <a:endParaRPr lang="zh-TW" altLang="en-US"/>
           </a:p>
@@ -844,6 +851,7 @@
           <a:p>
             <a:fld id="{E25A07D8-C1D8-4E95-BF69-D06ECFCCAECB}" type="slidenum">
               <a:rPr lang="zh-TW" altLang="en-US" smtClean="0"/>
+              <a:pPr/>
               <a:t>‹#›</a:t>
             </a:fld>
             <a:endParaRPr lang="zh-TW" altLang="en-US"/>
@@ -1043,7 +1051,8 @@
           <a:p>
             <a:fld id="{A316576E-A9EF-4C0D-A32C-58F4A3F27278}" type="datetimeFigureOut">
               <a:rPr lang="zh-TW" altLang="en-US" smtClean="0"/>
-              <a:t>2019/2/11</a:t>
+              <a:pPr/>
+              <a:t>2019/2/24</a:t>
             </a:fld>
             <a:endParaRPr lang="zh-TW" altLang="en-US"/>
           </a:p>
@@ -1085,6 +1094,7 @@
           <a:p>
             <a:fld id="{E25A07D8-C1D8-4E95-BF69-D06ECFCCAECB}" type="slidenum">
               <a:rPr lang="zh-TW" altLang="en-US" smtClean="0"/>
+              <a:pPr/>
               <a:t>‹#›</a:t>
             </a:fld>
             <a:endParaRPr lang="zh-TW" altLang="en-US"/>
@@ -1326,7 +1336,8 @@
           <a:p>
             <a:fld id="{A316576E-A9EF-4C0D-A32C-58F4A3F27278}" type="datetimeFigureOut">
               <a:rPr lang="zh-TW" altLang="en-US" smtClean="0"/>
-              <a:t>2019/2/11</a:t>
+              <a:pPr/>
+              <a:t>2019/2/24</a:t>
             </a:fld>
             <a:endParaRPr lang="zh-TW" altLang="en-US"/>
           </a:p>
@@ -1368,6 +1379,7 @@
           <a:p>
             <a:fld id="{E25A07D8-C1D8-4E95-BF69-D06ECFCCAECB}" type="slidenum">
               <a:rPr lang="zh-TW" altLang="en-US" smtClean="0"/>
+              <a:pPr/>
               <a:t>‹#›</a:t>
             </a:fld>
             <a:endParaRPr lang="zh-TW" altLang="en-US"/>
@@ -1743,7 +1755,8 @@
           <a:p>
             <a:fld id="{A316576E-A9EF-4C0D-A32C-58F4A3F27278}" type="datetimeFigureOut">
               <a:rPr lang="zh-TW" altLang="en-US" smtClean="0"/>
-              <a:t>2019/2/11</a:t>
+              <a:pPr/>
+              <a:t>2019/2/24</a:t>
             </a:fld>
             <a:endParaRPr lang="zh-TW" altLang="en-US"/>
           </a:p>
@@ -1785,6 +1798,7 @@
           <a:p>
             <a:fld id="{E25A07D8-C1D8-4E95-BF69-D06ECFCCAECB}" type="slidenum">
               <a:rPr lang="zh-TW" altLang="en-US" smtClean="0"/>
+              <a:pPr/>
               <a:t>‹#›</a:t>
             </a:fld>
             <a:endParaRPr lang="zh-TW" altLang="en-US"/>
@@ -1856,7 +1870,8 @@
           <a:p>
             <a:fld id="{A316576E-A9EF-4C0D-A32C-58F4A3F27278}" type="datetimeFigureOut">
               <a:rPr lang="zh-TW" altLang="en-US" smtClean="0"/>
-              <a:t>2019/2/11</a:t>
+              <a:pPr/>
+              <a:t>2019/2/24</a:t>
             </a:fld>
             <a:endParaRPr lang="zh-TW" altLang="en-US"/>
           </a:p>
@@ -1898,6 +1913,7 @@
           <a:p>
             <a:fld id="{E25A07D8-C1D8-4E95-BF69-D06ECFCCAECB}" type="slidenum">
               <a:rPr lang="zh-TW" altLang="en-US" smtClean="0"/>
+              <a:pPr/>
               <a:t>‹#›</a:t>
             </a:fld>
             <a:endParaRPr lang="zh-TW" altLang="en-US"/>
@@ -1946,7 +1962,8 @@
           <a:p>
             <a:fld id="{A316576E-A9EF-4C0D-A32C-58F4A3F27278}" type="datetimeFigureOut">
               <a:rPr lang="zh-TW" altLang="en-US" smtClean="0"/>
-              <a:t>2019/2/11</a:t>
+              <a:pPr/>
+              <a:t>2019/2/24</a:t>
             </a:fld>
             <a:endParaRPr lang="zh-TW" altLang="en-US"/>
           </a:p>
@@ -1988,6 +2005,7 @@
           <a:p>
             <a:fld id="{E25A07D8-C1D8-4E95-BF69-D06ECFCCAECB}" type="slidenum">
               <a:rPr lang="zh-TW" altLang="en-US" smtClean="0"/>
+              <a:pPr/>
               <a:t>‹#›</a:t>
             </a:fld>
             <a:endParaRPr lang="zh-TW" altLang="en-US"/>
@@ -2218,7 +2236,8 @@
           <a:p>
             <a:fld id="{A316576E-A9EF-4C0D-A32C-58F4A3F27278}" type="datetimeFigureOut">
               <a:rPr lang="zh-TW" altLang="en-US" smtClean="0"/>
-              <a:t>2019/2/11</a:t>
+              <a:pPr/>
+              <a:t>2019/2/24</a:t>
             </a:fld>
             <a:endParaRPr lang="zh-TW" altLang="en-US"/>
           </a:p>
@@ -2260,6 +2279,7 @@
           <a:p>
             <a:fld id="{E25A07D8-C1D8-4E95-BF69-D06ECFCCAECB}" type="slidenum">
               <a:rPr lang="zh-TW" altLang="en-US" smtClean="0"/>
+              <a:pPr/>
               <a:t>‹#›</a:t>
             </a:fld>
             <a:endParaRPr lang="zh-TW" altLang="en-US"/>
@@ -2466,7 +2486,8 @@
           <a:p>
             <a:fld id="{A316576E-A9EF-4C0D-A32C-58F4A3F27278}" type="datetimeFigureOut">
               <a:rPr lang="zh-TW" altLang="en-US" smtClean="0"/>
-              <a:t>2019/2/11</a:t>
+              <a:pPr/>
+              <a:t>2019/2/24</a:t>
             </a:fld>
             <a:endParaRPr lang="zh-TW" altLang="en-US"/>
           </a:p>
@@ -2508,6 +2529,7 @@
           <a:p>
             <a:fld id="{E25A07D8-C1D8-4E95-BF69-D06ECFCCAECB}" type="slidenum">
               <a:rPr lang="zh-TW" altLang="en-US" smtClean="0"/>
+              <a:pPr/>
               <a:t>‹#›</a:t>
             </a:fld>
             <a:endParaRPr lang="zh-TW" altLang="en-US"/>
@@ -2674,7 +2696,8 @@
           <a:p>
             <a:fld id="{A316576E-A9EF-4C0D-A32C-58F4A3F27278}" type="datetimeFigureOut">
               <a:rPr lang="zh-TW" altLang="en-US" smtClean="0"/>
-              <a:t>2019/2/11</a:t>
+              <a:pPr/>
+              <a:t>2019/2/24</a:t>
             </a:fld>
             <a:endParaRPr lang="zh-TW" altLang="en-US"/>
           </a:p>
@@ -2752,6 +2775,7 @@
           <a:p>
             <a:fld id="{E25A07D8-C1D8-4E95-BF69-D06ECFCCAECB}" type="slidenum">
               <a:rPr lang="zh-TW" altLang="en-US" smtClean="0"/>
+              <a:pPr/>
               <a:t>‹#›</a:t>
             </a:fld>
             <a:endParaRPr lang="zh-TW" altLang="en-US"/>
@@ -3056,7 +3080,7 @@
           <a:blip r:embed="rId2">
             <a:extLst>
               <a:ext uri="{28A0092B-C50C-407E-A947-70E740481C1C}">
-                <a14:useLocalDpi xmlns:a14="http://schemas.microsoft.com/office/drawing/2010/main" xmlns="" val="0"/>
+                <a14:useLocalDpi xmlns="" xmlns:a14="http://schemas.microsoft.com/office/drawing/2010/main" val="0"/>
               </a:ext>
             </a:extLst>
           </a:blip>
@@ -3494,7 +3518,7 @@
     </p:spTree>
     <p:extLst>
       <p:ext uri="{BB962C8B-B14F-4D97-AF65-F5344CB8AC3E}">
-        <p14:creationId xmlns:p14="http://schemas.microsoft.com/office/powerpoint/2010/main" xmlns="" val="1378671795"/>
+        <p14:creationId xmlns="" xmlns:p14="http://schemas.microsoft.com/office/powerpoint/2010/main" val="1378671795"/>
       </p:ext>
     </p:extLst>
   </p:cSld>
@@ -3540,7 +3564,7 @@
           <a:blip r:embed="rId2">
             <a:extLst>
               <a:ext uri="{28A0092B-C50C-407E-A947-70E740481C1C}">
-                <a14:useLocalDpi xmlns:a14="http://schemas.microsoft.com/office/drawing/2010/main" xmlns="" val="0"/>
+                <a14:useLocalDpi xmlns="" xmlns:a14="http://schemas.microsoft.com/office/drawing/2010/main" val="0"/>
               </a:ext>
             </a:extLst>
           </a:blip>
@@ -4089,7 +4113,7 @@
     </p:spTree>
     <p:extLst>
       <p:ext uri="{BB962C8B-B14F-4D97-AF65-F5344CB8AC3E}">
-        <p14:creationId xmlns:p14="http://schemas.microsoft.com/office/powerpoint/2010/main" xmlns="" val="1805859843"/>
+        <p14:creationId xmlns="" xmlns:p14="http://schemas.microsoft.com/office/powerpoint/2010/main" val="1805859843"/>
       </p:ext>
     </p:extLst>
   </p:cSld>
@@ -4135,7 +4159,7 @@
           <a:blip r:embed="rId2">
             <a:extLst>
               <a:ext uri="{28A0092B-C50C-407E-A947-70E740481C1C}">
-                <a14:useLocalDpi xmlns:a14="http://schemas.microsoft.com/office/drawing/2010/main" xmlns="" val="0"/>
+                <a14:useLocalDpi xmlns="" xmlns:a14="http://schemas.microsoft.com/office/drawing/2010/main" val="0"/>
               </a:ext>
             </a:extLst>
           </a:blip>
@@ -4188,12 +4212,11 @@
               <a:t> </a:t>
             </a:r>
             <a:r>
-              <a:rPr lang="zh-TW" altLang="en-US" b="1" dirty="0" smtClean="0">
+              <a:rPr lang="zh-TW" altLang="en-US" sz="5400" b="1" dirty="0" smtClean="0">
                 <a:ln w="22225">
                   <a:noFill/>
                   <a:prstDash val="solid"/>
                 </a:ln>
-                <a:effectLst/>
                 <a:latin typeface="標楷體" panose="03000509000000000000" pitchFamily="65" charset="-120"/>
                 <a:ea typeface="標楷體" panose="03000509000000000000" pitchFamily="65" charset="-120"/>
               </a:rPr>
@@ -4219,8 +4242,8 @@
               <a:t>         </a:t>
             </a:r>
             <a:r>
-              <a:rPr lang="zh-TW" altLang="en-US" b="1" dirty="0" smtClean="0">
-                <a:ln w="12700">
+              <a:rPr lang="zh-TW" altLang="en-US" sz="5400" b="1" dirty="0" smtClean="0">
+                <a:ln w="22225">
                   <a:noFill/>
                   <a:prstDash val="solid"/>
                 </a:ln>
@@ -4430,22 +4453,10 @@
                   <a:noFill/>
                   <a:prstDash val="solid"/>
                 </a:ln>
-                <a:effectLst/>
-                <a:latin typeface="標楷體" panose="03000509000000000000" pitchFamily="65" charset="-120"/>
-                <a:ea typeface="標楷體" panose="03000509000000000000" pitchFamily="65" charset="-120"/>
-              </a:rPr>
-              <a:t>耶 和 華      </a:t>
-            </a:r>
-            <a:r>
-              <a:rPr lang="zh-TW" altLang="en-US" sz="5400" b="1" dirty="0" smtClean="0">
-                <a:ln w="12700">
-                  <a:noFill/>
-                  <a:prstDash val="solid"/>
-                </a:ln>
-                <a:latin typeface="標楷體" panose="03000509000000000000" pitchFamily="65" charset="-120"/>
-                <a:ea typeface="標楷體" panose="03000509000000000000" pitchFamily="65" charset="-120"/>
-              </a:rPr>
-              <a:t>陰蔽</a:t>
+                <a:latin typeface="標楷體" panose="03000509000000000000" pitchFamily="65" charset="-120"/>
+                <a:ea typeface="標楷體" panose="03000509000000000000" pitchFamily="65" charset="-120"/>
+              </a:rPr>
+              <a:t>耶 和 華      陰蔽</a:t>
             </a:r>
             <a:r>
               <a:rPr lang="en-US" altLang="zh-TW" sz="5400" b="1" dirty="0" smtClean="0">
@@ -4804,7 +4815,7 @@
     </p:spTree>
     <p:extLst>
       <p:ext uri="{BB962C8B-B14F-4D97-AF65-F5344CB8AC3E}">
-        <p14:creationId xmlns:p14="http://schemas.microsoft.com/office/powerpoint/2010/main" xmlns="" val="2867787060"/>
+        <p14:creationId xmlns="" xmlns:p14="http://schemas.microsoft.com/office/powerpoint/2010/main" val="2867787060"/>
       </p:ext>
     </p:extLst>
   </p:cSld>
@@ -4850,7 +4861,7 @@
           <a:blip r:embed="rId2">
             <a:extLst>
               <a:ext uri="{28A0092B-C50C-407E-A947-70E740481C1C}">
-                <a14:useLocalDpi xmlns:a14="http://schemas.microsoft.com/office/drawing/2010/main" xmlns="" val="0"/>
+                <a14:useLocalDpi xmlns="" xmlns:a14="http://schemas.microsoft.com/office/drawing/2010/main" val="0"/>
               </a:ext>
             </a:extLst>
           </a:blip>
@@ -5507,7 +5518,7 @@
     </p:spTree>
     <p:extLst>
       <p:ext uri="{BB962C8B-B14F-4D97-AF65-F5344CB8AC3E}">
-        <p14:creationId xmlns:p14="http://schemas.microsoft.com/office/powerpoint/2010/main" xmlns="" val="310750511"/>
+        <p14:creationId xmlns="" xmlns:p14="http://schemas.microsoft.com/office/powerpoint/2010/main" val="310750511"/>
       </p:ext>
     </p:extLst>
   </p:cSld>
@@ -5553,7 +5564,7 @@
           <a:blip r:embed="rId2">
             <a:extLst>
               <a:ext uri="{28A0092B-C50C-407E-A947-70E740481C1C}">
-                <a14:useLocalDpi xmlns:a14="http://schemas.microsoft.com/office/drawing/2010/main" xmlns="" val="0"/>
+                <a14:useLocalDpi xmlns="" xmlns:a14="http://schemas.microsoft.com/office/drawing/2010/main" val="0"/>
               </a:ext>
             </a:extLst>
           </a:blip>
@@ -6157,7 +6168,7 @@
     </p:spTree>
     <p:extLst>
       <p:ext uri="{BB962C8B-B14F-4D97-AF65-F5344CB8AC3E}">
-        <p14:creationId xmlns:p14="http://schemas.microsoft.com/office/powerpoint/2010/main" xmlns="" val="3224731969"/>
+        <p14:creationId xmlns="" xmlns:p14="http://schemas.microsoft.com/office/powerpoint/2010/main" val="3224731969"/>
       </p:ext>
     </p:extLst>
   </p:cSld>
@@ -6203,7 +6214,7 @@
           <a:blip r:embed="rId2">
             <a:extLst>
               <a:ext uri="{28A0092B-C50C-407E-A947-70E740481C1C}">
-                <a14:useLocalDpi xmlns:a14="http://schemas.microsoft.com/office/drawing/2010/main" xmlns="" val="0"/>
+                <a14:useLocalDpi xmlns="" xmlns:a14="http://schemas.microsoft.com/office/drawing/2010/main" val="0"/>
               </a:ext>
             </a:extLst>
           </a:blip>
@@ -6656,7 +6667,7 @@
     </p:spTree>
     <p:extLst>
       <p:ext uri="{BB962C8B-B14F-4D97-AF65-F5344CB8AC3E}">
-        <p14:creationId xmlns:p14="http://schemas.microsoft.com/office/powerpoint/2010/main" xmlns="" val="939273827"/>
+        <p14:creationId xmlns="" xmlns:p14="http://schemas.microsoft.com/office/powerpoint/2010/main" val="939273827"/>
       </p:ext>
     </p:extLst>
   </p:cSld>
@@ -6702,7 +6713,7 @@
           <a:blip r:embed="rId2">
             <a:extLst>
               <a:ext uri="{28A0092B-C50C-407E-A947-70E740481C1C}">
-                <a14:useLocalDpi xmlns:a14="http://schemas.microsoft.com/office/drawing/2010/main" xmlns="" val="0"/>
+                <a14:useLocalDpi xmlns="" xmlns:a14="http://schemas.microsoft.com/office/drawing/2010/main" val="0"/>
               </a:ext>
             </a:extLst>
           </a:blip>
@@ -7197,7 +7208,7 @@
     </p:spTree>
     <p:extLst>
       <p:ext uri="{BB962C8B-B14F-4D97-AF65-F5344CB8AC3E}">
-        <p14:creationId xmlns:p14="http://schemas.microsoft.com/office/powerpoint/2010/main" xmlns="" val="196499516"/>
+        <p14:creationId xmlns="" xmlns:p14="http://schemas.microsoft.com/office/powerpoint/2010/main" val="196499516"/>
       </p:ext>
     </p:extLst>
   </p:cSld>
@@ -7243,7 +7254,7 @@
           <a:blip r:embed="rId2">
             <a:extLst>
               <a:ext uri="{28A0092B-C50C-407E-A947-70E740481C1C}">
-                <a14:useLocalDpi xmlns:a14="http://schemas.microsoft.com/office/drawing/2010/main" xmlns="" val="0"/>
+                <a14:useLocalDpi xmlns="" xmlns:a14="http://schemas.microsoft.com/office/drawing/2010/main" val="0"/>
               </a:ext>
             </a:extLst>
           </a:blip>
@@ -7620,17 +7631,7 @@
                 <a:latin typeface="Times New Roman" panose="02020603050405020304" pitchFamily="18" charset="0"/>
                 <a:cs typeface="Times New Roman" panose="02020603050405020304" pitchFamily="18" charset="0"/>
               </a:rPr>
-              <a:t>y</a:t>
-            </a:r>
-            <a:r>
-              <a:rPr lang="en-US" altLang="zh-TW" sz="4600" dirty="0" err="1" smtClean="0">
-                <a:solidFill>
-                  <a:schemeClr val="tx1"/>
-                </a:solidFill>
-                <a:latin typeface="Times New Roman" panose="02020603050405020304" pitchFamily="18" charset="0"/>
-                <a:cs typeface="Times New Roman" panose="02020603050405020304" pitchFamily="18" charset="0"/>
-              </a:rPr>
-              <a:t>īn</a:t>
+              <a:t>yīn</a:t>
             </a:r>
             <a:r>
               <a:rPr lang="en-US" altLang="zh-TW" sz="4600" dirty="0">
@@ -7692,7 +7693,7 @@
     </p:spTree>
     <p:extLst>
       <p:ext uri="{BB962C8B-B14F-4D97-AF65-F5344CB8AC3E}">
-        <p14:creationId xmlns:p14="http://schemas.microsoft.com/office/powerpoint/2010/main" xmlns="" val="2502160408"/>
+        <p14:creationId xmlns="" xmlns:p14="http://schemas.microsoft.com/office/powerpoint/2010/main" val="2502160408"/>
       </p:ext>
     </p:extLst>
   </p:cSld>
@@ -7738,7 +7739,7 @@
           <a:blip r:embed="rId2">
             <a:extLst>
               <a:ext uri="{28A0092B-C50C-407E-A947-70E740481C1C}">
-                <a14:useLocalDpi xmlns:a14="http://schemas.microsoft.com/office/drawing/2010/main" xmlns="" val="0"/>
+                <a14:useLocalDpi xmlns="" xmlns:a14="http://schemas.microsoft.com/office/drawing/2010/main" val="0"/>
               </a:ext>
             </a:extLst>
           </a:blip>
@@ -8233,7 +8234,7 @@
     </p:spTree>
     <p:extLst>
       <p:ext uri="{BB962C8B-B14F-4D97-AF65-F5344CB8AC3E}">
-        <p14:creationId xmlns:p14="http://schemas.microsoft.com/office/powerpoint/2010/main" xmlns="" val="196499516"/>
+        <p14:creationId xmlns="" xmlns:p14="http://schemas.microsoft.com/office/powerpoint/2010/main" val="196499516"/>
       </p:ext>
     </p:extLst>
   </p:cSld>
@@ -8279,7 +8280,7 @@
           <a:blip r:embed="rId2">
             <a:extLst>
               <a:ext uri="{28A0092B-C50C-407E-A947-70E740481C1C}">
-                <a14:useLocalDpi xmlns:a14="http://schemas.microsoft.com/office/drawing/2010/main" xmlns="" val="0"/>
+                <a14:useLocalDpi xmlns="" xmlns:a14="http://schemas.microsoft.com/office/drawing/2010/main" val="0"/>
               </a:ext>
             </a:extLst>
           </a:blip>
@@ -8789,7 +8790,7 @@
     </p:spTree>
     <p:extLst>
       <p:ext uri="{BB962C8B-B14F-4D97-AF65-F5344CB8AC3E}">
-        <p14:creationId xmlns:p14="http://schemas.microsoft.com/office/powerpoint/2010/main" xmlns="" val="1700379359"/>
+        <p14:creationId xmlns="" xmlns:p14="http://schemas.microsoft.com/office/powerpoint/2010/main" val="1700379359"/>
       </p:ext>
     </p:extLst>
   </p:cSld>

</xml_diff>